<commit_message>
Add pics to dataset section
</commit_message>
<xml_diff>
--- a/CS229_poster.pptx
+++ b/CS229_poster.pptx
@@ -4239,7 +4239,7 @@
         <p:spPr>
           <a:xfrm>
             <a:off x="364505" y="5810375"/>
-            <a:ext cx="10984041" cy="9870626"/>
+            <a:ext cx="11257030" cy="10032972"/>
           </a:xfrm>
           <a:prstGeom prst="roundRect">
             <a:avLst>
@@ -4554,7 +4554,7 @@
         </p:nvSpPr>
         <p:spPr>
           <a:xfrm>
-            <a:off x="1905000" y="16478840"/>
+            <a:off x="1905000" y="16507322"/>
             <a:ext cx="7903053" cy="856532"/>
           </a:xfrm>
           <a:prstGeom prst="rect">
@@ -4570,7 +4570,7 @@
           <a:p>
             <a:pPr algn="ctr"/>
             <a:r>
-              <a:rPr lang="en-US" sz="4800" b="1" dirty="0" smtClean="0">
+              <a:rPr lang="en-US" sz="4800" b="1" smtClean="0">
                 <a:solidFill>
                   <a:schemeClr val="tx1">
                     <a:lumMod val="75000"/>
@@ -4579,7 +4579,7 @@
                 </a:solidFill>
                 <a:latin typeface="Calibri" panose="020F0502020204030204" pitchFamily="34" charset="0"/>
               </a:rPr>
-              <a:t>Dataset</a:t>
+              <a:t>Datasets</a:t>
             </a:r>
             <a:endParaRPr lang="en-US" sz="4800" b="1" dirty="0">
               <a:solidFill>
@@ -5034,8 +5034,8 @@
         </p:nvSpPr>
         <p:spPr>
           <a:xfrm>
-            <a:off x="13030200" y="24715361"/>
-            <a:ext cx="7903053" cy="1077218"/>
+            <a:off x="12666725" y="24618904"/>
+            <a:ext cx="7903053" cy="2123658"/>
           </a:xfrm>
           <a:prstGeom prst="rect">
             <a:avLst/>
@@ -5059,6 +5059,67 @@
                 <a:latin typeface="Calibri" panose="020F0502020204030204" pitchFamily="34" charset="0"/>
               </a:rPr>
               <a:t>Describe survey, table comparing three models with control</a:t>
+            </a:r>
+          </a:p>
+          <a:p>
+            <a:endParaRPr lang="en-US" sz="3200" dirty="0">
+              <a:solidFill>
+                <a:schemeClr val="tx1">
+                  <a:lumMod val="75000"/>
+                  <a:lumOff val="25000"/>
+                </a:schemeClr>
+              </a:solidFill>
+              <a:latin typeface="Calibri" panose="020F0502020204030204" pitchFamily="34" charset="0"/>
+            </a:endParaRPr>
+          </a:p>
+          <a:p>
+            <a:r>
+              <a:rPr lang="en-US" sz="3200" dirty="0" smtClean="0">
+                <a:solidFill>
+                  <a:schemeClr val="tx1">
+                    <a:lumMod val="75000"/>
+                    <a:lumOff val="25000"/>
+                  </a:schemeClr>
+                </a:solidFill>
+                <a:latin typeface="Calibri" panose="020F0502020204030204" pitchFamily="34" charset="0"/>
+              </a:rPr>
+              <a:t>Plot of </a:t>
+            </a:r>
+            <a:r>
+              <a:rPr lang="en-US" sz="3200" dirty="0" err="1" smtClean="0">
+                <a:solidFill>
+                  <a:schemeClr val="tx1">
+                    <a:lumMod val="75000"/>
+                    <a:lumOff val="25000"/>
+                  </a:schemeClr>
+                </a:solidFill>
+                <a:latin typeface="Calibri" panose="020F0502020204030204" pitchFamily="34" charset="0"/>
+              </a:rPr>
+              <a:t>clementi</a:t>
+            </a:r>
+            <a:r>
+              <a:rPr lang="en-US" sz="3200" dirty="0" smtClean="0">
+                <a:solidFill>
+                  <a:schemeClr val="tx1">
+                    <a:lumMod val="75000"/>
+                    <a:lumOff val="25000"/>
+                  </a:schemeClr>
+                </a:solidFill>
+                <a:latin typeface="Calibri" panose="020F0502020204030204" pitchFamily="34" charset="0"/>
+              </a:rPr>
+              <a:t> LSTM and corresponding </a:t>
+            </a:r>
+            <a:r>
+              <a:rPr lang="en-US" sz="3200" dirty="0" err="1" smtClean="0">
+                <a:solidFill>
+                  <a:schemeClr val="tx1">
+                    <a:lumMod val="75000"/>
+                    <a:lumOff val="25000"/>
+                  </a:schemeClr>
+                </a:solidFill>
+                <a:latin typeface="Calibri" panose="020F0502020204030204" pitchFamily="34" charset="0"/>
+              </a:rPr>
+              <a:t>traj</a:t>
             </a:r>
             <a:endParaRPr lang="en-US" sz="3600" dirty="0">
               <a:solidFill>
@@ -5129,6 +5190,261 @@
                 <a:latin typeface="Calibri" panose="020F0502020204030204" pitchFamily="34" charset="0"/>
               </a:rPr>
               <a:t>)</a:t>
+            </a:r>
+            <a:endParaRPr lang="en-US" sz="3600" dirty="0">
+              <a:solidFill>
+                <a:schemeClr val="tx1">
+                  <a:lumMod val="75000"/>
+                  <a:lumOff val="25000"/>
+                </a:schemeClr>
+              </a:solidFill>
+              <a:latin typeface="Calibri" panose="020F0502020204030204" pitchFamily="34" charset="0"/>
+            </a:endParaRPr>
+          </a:p>
+        </p:txBody>
+      </p:sp>
+      <p:sp>
+        <p:nvSpPr>
+          <p:cNvPr id="48" name="TextBox 47"/>
+          <p:cNvSpPr txBox="1"/>
+          <p:nvPr/>
+        </p:nvSpPr>
+        <p:spPr>
+          <a:xfrm>
+            <a:off x="990599" y="17458720"/>
+            <a:ext cx="7903053" cy="769441"/>
+          </a:xfrm>
+          <a:prstGeom prst="rect">
+            <a:avLst/>
+          </a:prstGeom>
+          <a:noFill/>
+        </p:spPr>
+        <p:txBody>
+          <a:bodyPr wrap="square" rtlCol="0">
+            <a:spAutoFit/>
+          </a:bodyPr>
+          <a:lstStyle/>
+          <a:p>
+            <a:r>
+              <a:rPr lang="en-US" sz="4400" i="1" dirty="0" smtClean="0">
+                <a:solidFill>
+                  <a:srgbClr val="A80C30"/>
+                </a:solidFill>
+                <a:latin typeface="Calibri" panose="020F0502020204030204" pitchFamily="34" charset="0"/>
+              </a:rPr>
+              <a:t>Music</a:t>
+            </a:r>
+            <a:endParaRPr lang="en-US" sz="4400" i="1" dirty="0">
+              <a:solidFill>
+                <a:srgbClr val="A80C30"/>
+              </a:solidFill>
+              <a:latin typeface="Calibri" panose="020F0502020204030204" pitchFamily="34" charset="0"/>
+            </a:endParaRPr>
+          </a:p>
+        </p:txBody>
+      </p:sp>
+      <p:sp>
+        <p:nvSpPr>
+          <p:cNvPr id="49" name="TextBox 48"/>
+          <p:cNvSpPr txBox="1"/>
+          <p:nvPr/>
+        </p:nvSpPr>
+        <p:spPr>
+          <a:xfrm>
+            <a:off x="990599" y="24234184"/>
+            <a:ext cx="7903053" cy="769441"/>
+          </a:xfrm>
+          <a:prstGeom prst="rect">
+            <a:avLst/>
+          </a:prstGeom>
+          <a:noFill/>
+        </p:spPr>
+        <p:txBody>
+          <a:bodyPr wrap="square" rtlCol="0">
+            <a:spAutoFit/>
+          </a:bodyPr>
+          <a:lstStyle/>
+          <a:p>
+            <a:r>
+              <a:rPr lang="en-US" sz="4400" i="1" dirty="0" smtClean="0">
+                <a:solidFill>
+                  <a:srgbClr val="A80C30"/>
+                </a:solidFill>
+                <a:latin typeface="Calibri" panose="020F0502020204030204" pitchFamily="34" charset="0"/>
+              </a:rPr>
+              <a:t>Chemical dynamics</a:t>
+            </a:r>
+            <a:endParaRPr lang="en-US" sz="4400" i="1" dirty="0">
+              <a:solidFill>
+                <a:srgbClr val="A80C30"/>
+              </a:solidFill>
+              <a:latin typeface="Calibri" panose="020F0502020204030204" pitchFamily="34" charset="0"/>
+            </a:endParaRPr>
+          </a:p>
+        </p:txBody>
+      </p:sp>
+      <p:pic>
+        <p:nvPicPr>
+          <p:cNvPr id="3" name="Picture 2"/>
+          <p:cNvPicPr>
+            <a:picLocks noChangeAspect="1"/>
+          </p:cNvPicPr>
+          <p:nvPr/>
+        </p:nvPicPr>
+        <p:blipFill>
+          <a:blip r:embed="rId4">
+            <a:extLst>
+              <a:ext uri="{28A0092B-C50C-407E-A947-70E740481C1C}">
+                <a14:useLocalDpi xmlns:a14="http://schemas.microsoft.com/office/drawing/2010/main" val="0"/>
+              </a:ext>
+            </a:extLst>
+          </a:blip>
+          <a:stretch>
+            <a:fillRect/>
+          </a:stretch>
+        </p:blipFill>
+        <p:spPr>
+          <a:xfrm>
+            <a:off x="1338549" y="24890717"/>
+            <a:ext cx="3175000" cy="3175000"/>
+          </a:xfrm>
+          <a:prstGeom prst="rect">
+            <a:avLst/>
+          </a:prstGeom>
+        </p:spPr>
+      </p:pic>
+      <p:pic>
+        <p:nvPicPr>
+          <p:cNvPr id="8" name="Picture 7"/>
+          <p:cNvPicPr>
+            <a:picLocks noChangeAspect="1"/>
+          </p:cNvPicPr>
+          <p:nvPr/>
+        </p:nvPicPr>
+        <p:blipFill rotWithShape="1">
+          <a:blip r:embed="rId5">
+            <a:extLst>
+              <a:ext uri="{28A0092B-C50C-407E-A947-70E740481C1C}">
+                <a14:useLocalDpi xmlns:a14="http://schemas.microsoft.com/office/drawing/2010/main" val="0"/>
+              </a:ext>
+            </a:extLst>
+          </a:blip>
+          <a:srcRect t="16830" b="26156"/>
+          <a:stretch/>
+        </p:blipFill>
+        <p:spPr>
+          <a:xfrm>
+            <a:off x="1126067" y="21536120"/>
+            <a:ext cx="9770482" cy="1485479"/>
+          </a:xfrm>
+          <a:prstGeom prst="rect">
+            <a:avLst/>
+          </a:prstGeom>
+        </p:spPr>
+      </p:pic>
+      <p:sp>
+        <p:nvSpPr>
+          <p:cNvPr id="58" name="TextBox 57"/>
+          <p:cNvSpPr txBox="1"/>
+          <p:nvPr/>
+        </p:nvSpPr>
+        <p:spPr>
+          <a:xfrm>
+            <a:off x="1132994" y="20856479"/>
+            <a:ext cx="7903053" cy="584775"/>
+          </a:xfrm>
+          <a:prstGeom prst="rect">
+            <a:avLst/>
+          </a:prstGeom>
+          <a:noFill/>
+        </p:spPr>
+        <p:txBody>
+          <a:bodyPr wrap="square" rtlCol="0">
+            <a:spAutoFit/>
+          </a:bodyPr>
+          <a:lstStyle/>
+          <a:p>
+            <a:r>
+              <a:rPr lang="en-US" sz="3200" dirty="0" smtClean="0">
+                <a:solidFill>
+                  <a:schemeClr val="tx1">
+                    <a:lumMod val="75000"/>
+                    <a:lumOff val="25000"/>
+                  </a:schemeClr>
+                </a:solidFill>
+                <a:latin typeface="Calibri" panose="020F0502020204030204" pitchFamily="34" charset="0"/>
+              </a:rPr>
+              <a:t>Range 0 to 127</a:t>
+            </a:r>
+            <a:r>
+              <a:rPr lang="en-US" sz="3200" smtClean="0">
+                <a:solidFill>
+                  <a:schemeClr val="tx1">
+                    <a:lumMod val="75000"/>
+                    <a:lumOff val="25000"/>
+                  </a:schemeClr>
+                </a:solidFill>
+                <a:latin typeface="Calibri" panose="020F0502020204030204" pitchFamily="34" charset="0"/>
+              </a:rPr>
+              <a:t>, most fall in 50-90</a:t>
+            </a:r>
+            <a:endParaRPr lang="en-US" sz="3600" dirty="0">
+              <a:solidFill>
+                <a:schemeClr val="tx1">
+                  <a:lumMod val="75000"/>
+                  <a:lumOff val="25000"/>
+                </a:schemeClr>
+              </a:solidFill>
+              <a:latin typeface="Calibri" panose="020F0502020204030204" pitchFamily="34" charset="0"/>
+            </a:endParaRPr>
+          </a:p>
+        </p:txBody>
+      </p:sp>
+      <p:sp>
+        <p:nvSpPr>
+          <p:cNvPr id="59" name="TextBox 58"/>
+          <p:cNvSpPr txBox="1"/>
+          <p:nvPr/>
+        </p:nvSpPr>
+        <p:spPr>
+          <a:xfrm>
+            <a:off x="6772294" y="25367438"/>
+            <a:ext cx="3162831" cy="1569660"/>
+          </a:xfrm>
+          <a:prstGeom prst="rect">
+            <a:avLst/>
+          </a:prstGeom>
+          <a:noFill/>
+        </p:spPr>
+        <p:txBody>
+          <a:bodyPr wrap="square" rtlCol="0">
+            <a:spAutoFit/>
+          </a:bodyPr>
+          <a:lstStyle/>
+          <a:p>
+            <a:r>
+              <a:rPr lang="en-US" sz="3200" dirty="0" smtClean="0">
+                <a:solidFill>
+                  <a:schemeClr val="tx1">
+                    <a:lumMod val="75000"/>
+                    <a:lumOff val="25000"/>
+                  </a:schemeClr>
+                </a:solidFill>
+                <a:latin typeface="Calibri" panose="020F0502020204030204" pitchFamily="34" charset="0"/>
+              </a:rPr>
+              <a:t>Trajectories normalized </a:t>
+            </a:r>
+            <a:r>
+              <a:rPr lang="en-US" sz="3200" smtClean="0">
+                <a:solidFill>
+                  <a:schemeClr val="tx1">
+                    <a:lumMod val="75000"/>
+                    <a:lumOff val="25000"/>
+                  </a:schemeClr>
+                </a:solidFill>
+                <a:latin typeface="Calibri" panose="020F0502020204030204" pitchFamily="34" charset="0"/>
+              </a:rPr>
+              <a:t>to range 50-90</a:t>
             </a:r>
             <a:endParaRPr lang="en-US" sz="3600" dirty="0">
               <a:solidFill>

</xml_diff>

<commit_message>
Added figures to results section
</commit_message>
<xml_diff>
--- a/CS229_poster.pptx
+++ b/CS229_poster.pptx
@@ -214,7 +214,7 @@
           <a:p>
             <a:fld id="{7EDC9FCA-5669-407A-B541-D0E7F9787720}" type="datetimeFigureOut">
               <a:rPr lang="en-US" smtClean="0"/>
-              <a:t>6/10/19</a:t>
+              <a:t>6/11/19</a:t>
             </a:fld>
             <a:endParaRPr lang="en-US"/>
           </a:p>
@@ -379,7 +379,7 @@
           <a:p>
             <a:fld id="{63D3EF91-396D-4FE8-A257-1E08692753AD}" type="datetimeFigureOut">
               <a:rPr lang="en-US" smtClean="0"/>
-              <a:t>6/10/19</a:t>
+              <a:t>6/11/19</a:t>
             </a:fld>
             <a:endParaRPr lang="en-US"/>
           </a:p>
@@ -888,7 +888,7 @@
           <a:p>
             <a:fld id="{DE360518-F3EA-4C30-8886-B3FF6145F6F2}" type="datetimeFigureOut">
               <a:rPr lang="en-US" smtClean="0"/>
-              <a:t>6/10/19</a:t>
+              <a:t>6/11/19</a:t>
             </a:fld>
             <a:endParaRPr lang="en-US"/>
           </a:p>
@@ -1066,7 +1066,7 @@
           <a:p>
             <a:fld id="{DE360518-F3EA-4C30-8886-B3FF6145F6F2}" type="datetimeFigureOut">
               <a:rPr lang="en-US" smtClean="0"/>
-              <a:t>6/10/19</a:t>
+              <a:t>6/11/19</a:t>
             </a:fld>
             <a:endParaRPr lang="en-US"/>
           </a:p>
@@ -1234,7 +1234,7 @@
           <a:p>
             <a:fld id="{DE360518-F3EA-4C30-8886-B3FF6145F6F2}" type="datetimeFigureOut">
               <a:rPr lang="en-US" smtClean="0"/>
-              <a:t>6/10/19</a:t>
+              <a:t>6/11/19</a:t>
             </a:fld>
             <a:endParaRPr lang="en-US"/>
           </a:p>
@@ -1479,7 +1479,7 @@
           <a:p>
             <a:fld id="{DE360518-F3EA-4C30-8886-B3FF6145F6F2}" type="datetimeFigureOut">
               <a:rPr lang="en-US" smtClean="0"/>
-              <a:t>6/10/19</a:t>
+              <a:t>6/11/19</a:t>
             </a:fld>
             <a:endParaRPr lang="en-US"/>
           </a:p>
@@ -1764,7 +1764,7 @@
           <a:p>
             <a:fld id="{DE360518-F3EA-4C30-8886-B3FF6145F6F2}" type="datetimeFigureOut">
               <a:rPr lang="en-US" smtClean="0"/>
-              <a:t>6/10/19</a:t>
+              <a:t>6/11/19</a:t>
             </a:fld>
             <a:endParaRPr lang="en-US"/>
           </a:p>
@@ -2188,7 +2188,7 @@
           <a:p>
             <a:fld id="{DE360518-F3EA-4C30-8886-B3FF6145F6F2}" type="datetimeFigureOut">
               <a:rPr lang="en-US" smtClean="0"/>
-              <a:t>6/10/19</a:t>
+              <a:t>6/11/19</a:t>
             </a:fld>
             <a:endParaRPr lang="en-US"/>
           </a:p>
@@ -2305,7 +2305,7 @@
           <a:p>
             <a:fld id="{DE360518-F3EA-4C30-8886-B3FF6145F6F2}" type="datetimeFigureOut">
               <a:rPr lang="en-US" smtClean="0"/>
-              <a:t>6/10/19</a:t>
+              <a:t>6/11/19</a:t>
             </a:fld>
             <a:endParaRPr lang="en-US"/>
           </a:p>
@@ -2400,7 +2400,7 @@
           <a:p>
             <a:fld id="{DE360518-F3EA-4C30-8886-B3FF6145F6F2}" type="datetimeFigureOut">
               <a:rPr lang="en-US" smtClean="0"/>
-              <a:t>6/10/19</a:t>
+              <a:t>6/11/19</a:t>
             </a:fld>
             <a:endParaRPr lang="en-US"/>
           </a:p>
@@ -2675,7 +2675,7 @@
           <a:p>
             <a:fld id="{DE360518-F3EA-4C30-8886-B3FF6145F6F2}" type="datetimeFigureOut">
               <a:rPr lang="en-US" smtClean="0"/>
-              <a:t>6/10/19</a:t>
+              <a:t>6/11/19</a:t>
             </a:fld>
             <a:endParaRPr lang="en-US"/>
           </a:p>
@@ -2927,7 +2927,7 @@
           <a:p>
             <a:fld id="{DE360518-F3EA-4C30-8886-B3FF6145F6F2}" type="datetimeFigureOut">
               <a:rPr lang="en-US" smtClean="0"/>
-              <a:t>6/10/19</a:t>
+              <a:t>6/11/19</a:t>
             </a:fld>
             <a:endParaRPr lang="en-US"/>
           </a:p>
@@ -3138,7 +3138,7 @@
           <a:p>
             <a:fld id="{DE360518-F3EA-4C30-8886-B3FF6145F6F2}" type="datetimeFigureOut">
               <a:rPr lang="en-US" smtClean="0"/>
-              <a:t>6/10/19</a:t>
+              <a:t>6/11/19</a:t>
             </a:fld>
             <a:endParaRPr lang="en-US"/>
           </a:p>
@@ -4029,31 +4029,7 @@
                 </a:solidFill>
                 <a:latin typeface="Calibri" panose="020F0502020204030204" pitchFamily="34" charset="0"/>
               </a:rPr>
-              <a:t>), and K</a:t>
-            </a:r>
-            <a:r>
-              <a:rPr lang="en-US" altLang="en-US" sz="6000" dirty="0" smtClean="0">
-                <a:solidFill>
-                  <a:schemeClr val="tx1">
-                    <a:lumMod val="75000"/>
-                    <a:lumOff val="25000"/>
-                  </a:schemeClr>
-                </a:solidFill>
-                <a:latin typeface="Calibri" panose="020F0502020204030204" pitchFamily="34" charset="0"/>
-              </a:rPr>
-              <a:t>. Grace </a:t>
-            </a:r>
-            <a:r>
-              <a:rPr lang="en-US" altLang="en-US" sz="6000" dirty="0" smtClean="0">
-                <a:solidFill>
-                  <a:schemeClr val="tx1">
-                    <a:lumMod val="75000"/>
-                    <a:lumOff val="25000"/>
-                  </a:schemeClr>
-                </a:solidFill>
-                <a:latin typeface="Calibri" panose="020F0502020204030204" pitchFamily="34" charset="0"/>
-              </a:rPr>
-              <a:t>Johnson</a:t>
+              <a:t>), and K. Grace Johnson</a:t>
             </a:r>
             <a:r>
               <a:rPr lang="en-US" altLang="en-US" sz="6000" baseline="30000" dirty="0" smtClean="0">
@@ -4337,58 +4313,6 @@
       </p:sp>
       <p:sp>
         <p:nvSpPr>
-          <p:cNvPr id="2" name="Rectangle 1">
-            <a:extLst>
-              <a:ext uri="{FF2B5EF4-FFF2-40B4-BE49-F238E27FC236}">
-                <a16:creationId xmlns="" xmlns:a16="http://schemas.microsoft.com/office/drawing/2014/main" id="{293EB99A-E364-6547-8517-04C5230A7CAD}"/>
-              </a:ext>
-            </a:extLst>
-          </p:cNvPr>
-          <p:cNvSpPr/>
-          <p:nvPr/>
-        </p:nvSpPr>
-        <p:spPr>
-          <a:xfrm>
-            <a:off x="27264067" y="25792579"/>
-            <a:ext cx="596532" cy="685638"/>
-          </a:xfrm>
-          <a:prstGeom prst="rect">
-            <a:avLst/>
-          </a:prstGeom>
-          <a:solidFill>
-            <a:schemeClr val="bg1"/>
-          </a:solidFill>
-          <a:ln>
-            <a:noFill/>
-          </a:ln>
-        </p:spPr>
-        <p:style>
-          <a:lnRef idx="2">
-            <a:schemeClr val="accent1">
-              <a:shade val="50000"/>
-            </a:schemeClr>
-          </a:lnRef>
-          <a:fillRef idx="1">
-            <a:schemeClr val="accent1"/>
-          </a:fillRef>
-          <a:effectRef idx="0">
-            <a:schemeClr val="accent1"/>
-          </a:effectRef>
-          <a:fontRef idx="minor">
-            <a:schemeClr val="lt1"/>
-          </a:fontRef>
-        </p:style>
-        <p:txBody>
-          <a:bodyPr rtlCol="0" anchor="ctr"/>
-          <a:lstStyle/>
-          <a:p>
-            <a:pPr algn="ctr"/>
-            <a:endParaRPr lang="en-US"/>
-          </a:p>
-        </p:txBody>
-      </p:sp>
-      <p:sp>
-        <p:nvSpPr>
           <p:cNvPr id="30" name="Rectangle: Rounded Corners 110"/>
           <p:cNvSpPr/>
           <p:nvPr/>
@@ -5014,42 +4938,8 @@
               </a:rPr>
               <a:t>Softmax</a:t>
             </a:r>
-            <a:endParaRPr lang="en-US" sz="4800" b="1" dirty="0">
-              <a:solidFill>
-                <a:schemeClr val="tx1">
-                  <a:lumMod val="75000"/>
-                  <a:lumOff val="25000"/>
-                </a:schemeClr>
-              </a:solidFill>
-              <a:latin typeface="Calibri" panose="020F0502020204030204" pitchFamily="34" charset="0"/>
-            </a:endParaRPr>
-          </a:p>
-        </p:txBody>
-      </p:sp>
-      <p:sp>
-        <p:nvSpPr>
-          <p:cNvPr id="46" name="TextBox 45"/>
-          <p:cNvSpPr txBox="1"/>
-          <p:nvPr/>
-        </p:nvSpPr>
-        <p:spPr>
-          <a:xfrm>
-            <a:off x="12666725" y="24618904"/>
-            <a:ext cx="7903053" cy="2123658"/>
-          </a:xfrm>
-          <a:prstGeom prst="rect">
-            <a:avLst/>
-          </a:prstGeom>
-          <a:noFill/>
-        </p:spPr>
-        <p:txBody>
-          <a:bodyPr wrap="square" rtlCol="0">
-            <a:spAutoFit/>
-          </a:bodyPr>
-          <a:lstStyle/>
-          <a:p>
-            <a:r>
-              <a:rPr lang="en-US" sz="3200" dirty="0" smtClean="0">
+            <a:r>
+              <a:rPr lang="en-US" sz="4800" b="1" dirty="0" smtClean="0">
                 <a:solidFill>
                   <a:schemeClr val="tx1">
                     <a:lumMod val="75000"/>
@@ -5058,70 +4948,9 @@
                 </a:solidFill>
                 <a:latin typeface="Calibri" panose="020F0502020204030204" pitchFamily="34" charset="0"/>
               </a:rPr>
-              <a:t>Describe survey, table comparing three models with control</a:t>
-            </a:r>
-          </a:p>
-          <a:p>
-            <a:endParaRPr lang="en-US" sz="3200" dirty="0">
-              <a:solidFill>
-                <a:schemeClr val="tx1">
-                  <a:lumMod val="75000"/>
-                  <a:lumOff val="25000"/>
-                </a:schemeClr>
-              </a:solidFill>
-              <a:latin typeface="Calibri" panose="020F0502020204030204" pitchFamily="34" charset="0"/>
-            </a:endParaRPr>
-          </a:p>
-          <a:p>
-            <a:r>
-              <a:rPr lang="en-US" sz="3200" dirty="0" smtClean="0">
-                <a:solidFill>
-                  <a:schemeClr val="tx1">
-                    <a:lumMod val="75000"/>
-                    <a:lumOff val="25000"/>
-                  </a:schemeClr>
-                </a:solidFill>
-                <a:latin typeface="Calibri" panose="020F0502020204030204" pitchFamily="34" charset="0"/>
-              </a:rPr>
-              <a:t>Plot of </a:t>
-            </a:r>
-            <a:r>
-              <a:rPr lang="en-US" sz="3200" dirty="0" err="1" smtClean="0">
-                <a:solidFill>
-                  <a:schemeClr val="tx1">
-                    <a:lumMod val="75000"/>
-                    <a:lumOff val="25000"/>
-                  </a:schemeClr>
-                </a:solidFill>
-                <a:latin typeface="Calibri" panose="020F0502020204030204" pitchFamily="34" charset="0"/>
-              </a:rPr>
-              <a:t>clementi</a:t>
-            </a:r>
-            <a:r>
-              <a:rPr lang="en-US" sz="3200" dirty="0" smtClean="0">
-                <a:solidFill>
-                  <a:schemeClr val="tx1">
-                    <a:lumMod val="75000"/>
-                    <a:lumOff val="25000"/>
-                  </a:schemeClr>
-                </a:solidFill>
-                <a:latin typeface="Calibri" panose="020F0502020204030204" pitchFamily="34" charset="0"/>
-              </a:rPr>
-              <a:t> LSTM and corresponding </a:t>
-            </a:r>
-            <a:r>
-              <a:rPr lang="en-US" sz="3200" dirty="0" err="1" smtClean="0">
-                <a:solidFill>
-                  <a:schemeClr val="tx1">
-                    <a:lumMod val="75000"/>
-                    <a:lumOff val="25000"/>
-                  </a:schemeClr>
-                </a:solidFill>
-                <a:latin typeface="Calibri" panose="020F0502020204030204" pitchFamily="34" charset="0"/>
-              </a:rPr>
-              <a:t>traj</a:t>
-            </a:r>
-            <a:endParaRPr lang="en-US" sz="3600" dirty="0">
+              <a:t> regression</a:t>
+            </a:r>
+            <a:endParaRPr lang="en-US" sz="4800" b="1" dirty="0">
               <a:solidFill>
                 <a:schemeClr val="tx1">
                   <a:lumMod val="75000"/>
@@ -5458,6 +5287,619 @@
           </a:p>
         </p:txBody>
       </p:sp>
+      <p:graphicFrame>
+        <p:nvGraphicFramePr>
+          <p:cNvPr id="5" name="Table 4"/>
+          <p:cNvGraphicFramePr>
+            <a:graphicFrameLocks noGrp="1"/>
+          </p:cNvGraphicFramePr>
+          <p:nvPr>
+            <p:extLst>
+              <p:ext uri="{D42A27DB-BD31-4B8C-83A1-F6EECF244321}">
+                <p14:modId xmlns:p14="http://schemas.microsoft.com/office/powerpoint/2010/main" val="1541075546"/>
+              </p:ext>
+            </p:extLst>
+          </p:nvPr>
+        </p:nvGraphicFramePr>
+        <p:xfrm>
+          <a:off x="12559003" y="23455560"/>
+          <a:ext cx="7343939" cy="4579677"/>
+        </p:xfrm>
+        <a:graphic>
+          <a:graphicData uri="http://schemas.openxmlformats.org/drawingml/2006/table">
+            <a:tbl>
+              <a:tblPr firstRow="1" bandRow="1">
+                <a:tableStyleId>{2D5ABB26-0587-4C30-8999-92F81FD0307C}</a:tableStyleId>
+              </a:tblPr>
+              <a:tblGrid>
+                <a:gridCol w="4357905"/>
+                <a:gridCol w="2986034"/>
+              </a:tblGrid>
+              <a:tr h="508853">
+                <a:tc>
+                  <a:txBody>
+                    <a:bodyPr/>
+                    <a:lstStyle/>
+                    <a:p>
+                      <a:endParaRPr lang="en-US" sz="2600" dirty="0"/>
+                    </a:p>
+                  </a:txBody>
+                  <a:tcPr>
+                    <a:lnB w="12700" cap="flat" cmpd="sng" algn="ctr">
+                      <a:solidFill>
+                        <a:schemeClr val="tx1"/>
+                      </a:solidFill>
+                      <a:prstDash val="solid"/>
+                      <a:round/>
+                      <a:headEnd type="none" w="med" len="med"/>
+                      <a:tailEnd type="none" w="med" len="med"/>
+                    </a:lnB>
+                  </a:tcPr>
+                </a:tc>
+                <a:tc>
+                  <a:txBody>
+                    <a:bodyPr/>
+                    <a:lstStyle/>
+                    <a:p>
+                      <a:pPr algn="ctr"/>
+                      <a:r>
+                        <a:rPr lang="en-US" sz="2600" dirty="0" smtClean="0"/>
+                        <a:t>% answered human</a:t>
+                      </a:r>
+                      <a:endParaRPr lang="en-US" sz="2600" dirty="0"/>
+                    </a:p>
+                  </a:txBody>
+                  <a:tcPr>
+                    <a:lnB w="12700" cap="flat" cmpd="sng" algn="ctr">
+                      <a:solidFill>
+                        <a:schemeClr val="tx1"/>
+                      </a:solidFill>
+                      <a:prstDash val="solid"/>
+                      <a:round/>
+                      <a:headEnd type="none" w="med" len="med"/>
+                      <a:tailEnd type="none" w="med" len="med"/>
+                    </a:lnB>
+                  </a:tcPr>
+                </a:tc>
+              </a:tr>
+              <a:tr h="508853">
+                <a:tc>
+                  <a:txBody>
+                    <a:bodyPr/>
+                    <a:lstStyle/>
+                    <a:p>
+                      <a:r>
+                        <a:rPr lang="en-US" sz="2600" dirty="0" smtClean="0"/>
+                        <a:t>Generated</a:t>
+                      </a:r>
+                      <a:endParaRPr lang="en-US" sz="2600" dirty="0"/>
+                    </a:p>
+                  </a:txBody>
+                  <a:tcPr>
+                    <a:lnT w="12700" cap="flat" cmpd="sng" algn="ctr">
+                      <a:solidFill>
+                        <a:schemeClr val="tx1"/>
+                      </a:solidFill>
+                      <a:prstDash val="solid"/>
+                      <a:round/>
+                      <a:headEnd type="none" w="med" len="med"/>
+                      <a:tailEnd type="none" w="med" len="med"/>
+                    </a:lnT>
+                    <a:lnB w="12700" cap="flat" cmpd="sng" algn="ctr">
+                      <a:solidFill>
+                        <a:schemeClr val="tx1"/>
+                      </a:solidFill>
+                      <a:prstDash val="solid"/>
+                      <a:round/>
+                      <a:headEnd type="none" w="med" len="med"/>
+                      <a:tailEnd type="none" w="med" len="med"/>
+                    </a:lnB>
+                    <a:solidFill>
+                      <a:schemeClr val="bg1">
+                        <a:lumMod val="95000"/>
+                      </a:schemeClr>
+                    </a:solidFill>
+                  </a:tcPr>
+                </a:tc>
+                <a:tc>
+                  <a:txBody>
+                    <a:bodyPr/>
+                    <a:lstStyle/>
+                    <a:p>
+                      <a:pPr algn="ctr"/>
+                      <a:endParaRPr lang="en-US" sz="2600" dirty="0"/>
+                    </a:p>
+                  </a:txBody>
+                  <a:tcPr>
+                    <a:lnT w="12700" cap="flat" cmpd="sng" algn="ctr">
+                      <a:solidFill>
+                        <a:schemeClr val="tx1"/>
+                      </a:solidFill>
+                      <a:prstDash val="solid"/>
+                      <a:round/>
+                      <a:headEnd type="none" w="med" len="med"/>
+                      <a:tailEnd type="none" w="med" len="med"/>
+                    </a:lnT>
+                    <a:lnB w="12700" cap="flat" cmpd="sng" algn="ctr">
+                      <a:solidFill>
+                        <a:schemeClr val="tx1"/>
+                      </a:solidFill>
+                      <a:prstDash val="solid"/>
+                      <a:round/>
+                      <a:headEnd type="none" w="med" len="med"/>
+                      <a:tailEnd type="none" w="med" len="med"/>
+                    </a:lnB>
+                    <a:solidFill>
+                      <a:schemeClr val="bg1">
+                        <a:lumMod val="95000"/>
+                      </a:schemeClr>
+                    </a:solidFill>
+                  </a:tcPr>
+                </a:tc>
+              </a:tr>
+              <a:tr h="508853">
+                <a:tc>
+                  <a:txBody>
+                    <a:bodyPr/>
+                    <a:lstStyle/>
+                    <a:p>
+                      <a:pPr algn="l"/>
+                      <a:r>
+                        <a:rPr lang="en-US" sz="2600" dirty="0" smtClean="0"/>
+                        <a:t>      LSTM full</a:t>
+                      </a:r>
+                      <a:endParaRPr lang="en-US" sz="2600" dirty="0"/>
+                    </a:p>
+                  </a:txBody>
+                  <a:tcPr>
+                    <a:lnT w="12700" cap="flat" cmpd="sng" algn="ctr">
+                      <a:solidFill>
+                        <a:schemeClr val="tx1"/>
+                      </a:solidFill>
+                      <a:prstDash val="solid"/>
+                      <a:round/>
+                      <a:headEnd type="none" w="med" len="med"/>
+                      <a:tailEnd type="none" w="med" len="med"/>
+                    </a:lnT>
+                  </a:tcPr>
+                </a:tc>
+                <a:tc>
+                  <a:txBody>
+                    <a:bodyPr/>
+                    <a:lstStyle/>
+                    <a:p>
+                      <a:pPr algn="ctr"/>
+                      <a:r>
+                        <a:rPr lang="en-US" sz="2600" dirty="0" smtClean="0"/>
+                        <a:t>32%</a:t>
+                      </a:r>
+                      <a:endParaRPr lang="en-US" sz="2600" dirty="0"/>
+                    </a:p>
+                  </a:txBody>
+                  <a:tcPr>
+                    <a:lnT w="12700" cap="flat" cmpd="sng" algn="ctr">
+                      <a:solidFill>
+                        <a:schemeClr val="tx1"/>
+                      </a:solidFill>
+                      <a:prstDash val="solid"/>
+                      <a:round/>
+                      <a:headEnd type="none" w="med" len="med"/>
+                      <a:tailEnd type="none" w="med" len="med"/>
+                    </a:lnT>
+                  </a:tcPr>
+                </a:tc>
+              </a:tr>
+              <a:tr h="508853">
+                <a:tc>
+                  <a:txBody>
+                    <a:bodyPr/>
+                    <a:lstStyle/>
+                    <a:p>
+                      <a:pPr algn="l"/>
+                      <a:r>
+                        <a:rPr lang="en-US" sz="2600" dirty="0" smtClean="0"/>
+                        <a:t>      LSTM</a:t>
+                      </a:r>
+                      <a:r>
+                        <a:rPr lang="en-US" sz="2600" baseline="0" dirty="0" smtClean="0"/>
+                        <a:t> subset</a:t>
+                      </a:r>
+                      <a:endParaRPr lang="en-US" sz="2600" dirty="0"/>
+                    </a:p>
+                  </a:txBody>
+                  <a:tcPr>
+                    <a:lnB w="12700" cap="flat" cmpd="sng" algn="ctr">
+                      <a:solidFill>
+                        <a:schemeClr val="tx1"/>
+                      </a:solidFill>
+                      <a:prstDash val="solid"/>
+                      <a:round/>
+                      <a:headEnd type="none" w="med" len="med"/>
+                      <a:tailEnd type="none" w="med" len="med"/>
+                    </a:lnB>
+                  </a:tcPr>
+                </a:tc>
+                <a:tc>
+                  <a:txBody>
+                    <a:bodyPr/>
+                    <a:lstStyle/>
+                    <a:p>
+                      <a:pPr algn="ctr"/>
+                      <a:r>
+                        <a:rPr lang="en-US" sz="2600" dirty="0" smtClean="0"/>
+                        <a:t>61%</a:t>
+                      </a:r>
+                      <a:endParaRPr lang="en-US" sz="2600" dirty="0"/>
+                    </a:p>
+                  </a:txBody>
+                  <a:tcPr>
+                    <a:lnB w="12700" cap="flat" cmpd="sng" algn="ctr">
+                      <a:solidFill>
+                        <a:schemeClr val="tx1"/>
+                      </a:solidFill>
+                      <a:prstDash val="solid"/>
+                      <a:round/>
+                      <a:headEnd type="none" w="med" len="med"/>
+                      <a:tailEnd type="none" w="med" len="med"/>
+                    </a:lnB>
+                  </a:tcPr>
+                </a:tc>
+              </a:tr>
+              <a:tr h="508853">
+                <a:tc>
+                  <a:txBody>
+                    <a:bodyPr/>
+                    <a:lstStyle/>
+                    <a:p>
+                      <a:r>
+                        <a:rPr lang="en-US" sz="2600" dirty="0" smtClean="0"/>
+                        <a:t>Generated based on trajectory</a:t>
+                      </a:r>
+                      <a:endParaRPr lang="en-US" sz="2600" dirty="0"/>
+                    </a:p>
+                  </a:txBody>
+                  <a:tcPr>
+                    <a:lnT w="12700" cap="flat" cmpd="sng" algn="ctr">
+                      <a:solidFill>
+                        <a:schemeClr val="tx1"/>
+                      </a:solidFill>
+                      <a:prstDash val="solid"/>
+                      <a:round/>
+                      <a:headEnd type="none" w="med" len="med"/>
+                      <a:tailEnd type="none" w="med" len="med"/>
+                    </a:lnT>
+                    <a:lnB w="12700" cap="flat" cmpd="sng" algn="ctr">
+                      <a:solidFill>
+                        <a:schemeClr val="tx1"/>
+                      </a:solidFill>
+                      <a:prstDash val="solid"/>
+                      <a:round/>
+                      <a:headEnd type="none" w="med" len="med"/>
+                      <a:tailEnd type="none" w="med" len="med"/>
+                    </a:lnB>
+                    <a:solidFill>
+                      <a:schemeClr val="bg1">
+                        <a:lumMod val="95000"/>
+                      </a:schemeClr>
+                    </a:solidFill>
+                  </a:tcPr>
+                </a:tc>
+                <a:tc>
+                  <a:txBody>
+                    <a:bodyPr/>
+                    <a:lstStyle/>
+                    <a:p>
+                      <a:pPr algn="ctr"/>
+                      <a:endParaRPr lang="en-US" sz="2600" dirty="0"/>
+                    </a:p>
+                  </a:txBody>
+                  <a:tcPr>
+                    <a:lnT w="12700" cap="flat" cmpd="sng" algn="ctr">
+                      <a:solidFill>
+                        <a:schemeClr val="tx1"/>
+                      </a:solidFill>
+                      <a:prstDash val="solid"/>
+                      <a:round/>
+                      <a:headEnd type="none" w="med" len="med"/>
+                      <a:tailEnd type="none" w="med" len="med"/>
+                    </a:lnT>
+                    <a:lnB w="12700" cap="flat" cmpd="sng" algn="ctr">
+                      <a:solidFill>
+                        <a:schemeClr val="tx1"/>
+                      </a:solidFill>
+                      <a:prstDash val="solid"/>
+                      <a:round/>
+                      <a:headEnd type="none" w="med" len="med"/>
+                      <a:tailEnd type="none" w="med" len="med"/>
+                    </a:lnB>
+                    <a:solidFill>
+                      <a:schemeClr val="bg1">
+                        <a:lumMod val="95000"/>
+                      </a:schemeClr>
+                    </a:solidFill>
+                  </a:tcPr>
+                </a:tc>
+              </a:tr>
+              <a:tr h="508853">
+                <a:tc>
+                  <a:txBody>
+                    <a:bodyPr/>
+                    <a:lstStyle/>
+                    <a:p>
+                      <a:pPr algn="l"/>
+                      <a:r>
+                        <a:rPr lang="en-US" sz="2600" dirty="0" smtClean="0"/>
+                        <a:t>      </a:t>
+                      </a:r>
+                      <a:r>
+                        <a:rPr lang="en-US" sz="2600" dirty="0" err="1" smtClean="0"/>
+                        <a:t>softmax</a:t>
+                      </a:r>
+                      <a:r>
+                        <a:rPr lang="en-US" sz="2600" dirty="0" smtClean="0"/>
+                        <a:t> regression</a:t>
+                      </a:r>
+                      <a:endParaRPr lang="en-US" sz="2600" dirty="0"/>
+                    </a:p>
+                  </a:txBody>
+                  <a:tcPr>
+                    <a:lnT w="12700" cap="flat" cmpd="sng" algn="ctr">
+                      <a:solidFill>
+                        <a:schemeClr val="tx1"/>
+                      </a:solidFill>
+                      <a:prstDash val="solid"/>
+                      <a:round/>
+                      <a:headEnd type="none" w="med" len="med"/>
+                      <a:tailEnd type="none" w="med" len="med"/>
+                    </a:lnT>
+                  </a:tcPr>
+                </a:tc>
+                <a:tc>
+                  <a:txBody>
+                    <a:bodyPr/>
+                    <a:lstStyle/>
+                    <a:p>
+                      <a:pPr algn="ctr"/>
+                      <a:r>
+                        <a:rPr lang="en-US" sz="2600" dirty="0" smtClean="0"/>
+                        <a:t>14%</a:t>
+                      </a:r>
+                      <a:endParaRPr lang="en-US" sz="2600" dirty="0"/>
+                    </a:p>
+                  </a:txBody>
+                  <a:tcPr>
+                    <a:lnT w="12700" cap="flat" cmpd="sng" algn="ctr">
+                      <a:solidFill>
+                        <a:schemeClr val="tx1"/>
+                      </a:solidFill>
+                      <a:prstDash val="solid"/>
+                      <a:round/>
+                      <a:headEnd type="none" w="med" len="med"/>
+                      <a:tailEnd type="none" w="med" len="med"/>
+                    </a:lnT>
+                  </a:tcPr>
+                </a:tc>
+              </a:tr>
+              <a:tr h="508853">
+                <a:tc>
+                  <a:txBody>
+                    <a:bodyPr/>
+                    <a:lstStyle/>
+                    <a:p>
+                      <a:pPr algn="l"/>
+                      <a:r>
+                        <a:rPr lang="en-US" sz="2600" dirty="0" smtClean="0"/>
+                        <a:t>      GMM</a:t>
+                      </a:r>
+                      <a:endParaRPr lang="en-US" sz="2600" dirty="0"/>
+                    </a:p>
+                  </a:txBody>
+                  <a:tcPr/>
+                </a:tc>
+                <a:tc>
+                  <a:txBody>
+                    <a:bodyPr/>
+                    <a:lstStyle/>
+                    <a:p>
+                      <a:pPr algn="ctr"/>
+                      <a:r>
+                        <a:rPr lang="en-US" sz="2600" dirty="0" smtClean="0"/>
+                        <a:t>47%</a:t>
+                      </a:r>
+                      <a:endParaRPr lang="en-US" sz="2600" dirty="0"/>
+                    </a:p>
+                  </a:txBody>
+                  <a:tcPr/>
+                </a:tc>
+              </a:tr>
+              <a:tr h="508853">
+                <a:tc>
+                  <a:txBody>
+                    <a:bodyPr/>
+                    <a:lstStyle/>
+                    <a:p>
+                      <a:pPr algn="l"/>
+                      <a:r>
+                        <a:rPr lang="en-US" sz="2600" dirty="0" smtClean="0"/>
+                        <a:t>      LSTM subset</a:t>
+                      </a:r>
+                      <a:endParaRPr lang="en-US" sz="2600" dirty="0"/>
+                    </a:p>
+                  </a:txBody>
+                  <a:tcPr>
+                    <a:lnB w="12700" cap="flat" cmpd="sng" algn="ctr">
+                      <a:solidFill>
+                        <a:schemeClr val="tx1"/>
+                      </a:solidFill>
+                      <a:prstDash val="solid"/>
+                      <a:round/>
+                      <a:headEnd type="none" w="med" len="med"/>
+                      <a:tailEnd type="none" w="med" len="med"/>
+                    </a:lnB>
+                  </a:tcPr>
+                </a:tc>
+                <a:tc>
+                  <a:txBody>
+                    <a:bodyPr/>
+                    <a:lstStyle/>
+                    <a:p>
+                      <a:pPr algn="ctr"/>
+                      <a:r>
+                        <a:rPr lang="en-US" sz="2600" dirty="0" smtClean="0"/>
+                        <a:t>40%</a:t>
+                      </a:r>
+                      <a:endParaRPr lang="en-US" sz="2600" dirty="0"/>
+                    </a:p>
+                  </a:txBody>
+                  <a:tcPr>
+                    <a:lnB w="12700" cap="flat" cmpd="sng" algn="ctr">
+                      <a:solidFill>
+                        <a:schemeClr val="tx1"/>
+                      </a:solidFill>
+                      <a:prstDash val="solid"/>
+                      <a:round/>
+                      <a:headEnd type="none" w="med" len="med"/>
+                      <a:tailEnd type="none" w="med" len="med"/>
+                    </a:lnB>
+                  </a:tcPr>
+                </a:tc>
+              </a:tr>
+              <a:tr h="508853">
+                <a:tc>
+                  <a:txBody>
+                    <a:bodyPr/>
+                    <a:lstStyle/>
+                    <a:p>
+                      <a:r>
+                        <a:rPr lang="en-US" sz="2600" dirty="0" smtClean="0"/>
+                        <a:t>Real music (control)</a:t>
+                      </a:r>
+                      <a:endParaRPr lang="en-US" sz="2600" dirty="0"/>
+                    </a:p>
+                  </a:txBody>
+                  <a:tcPr>
+                    <a:lnT w="12700" cap="flat" cmpd="sng" algn="ctr">
+                      <a:solidFill>
+                        <a:schemeClr val="tx1"/>
+                      </a:solidFill>
+                      <a:prstDash val="solid"/>
+                      <a:round/>
+                      <a:headEnd type="none" w="med" len="med"/>
+                      <a:tailEnd type="none" w="med" len="med"/>
+                    </a:lnT>
+                    <a:lnB w="12700" cap="flat" cmpd="sng" algn="ctr">
+                      <a:solidFill>
+                        <a:schemeClr val="tx1"/>
+                      </a:solidFill>
+                      <a:prstDash val="solid"/>
+                      <a:round/>
+                      <a:headEnd type="none" w="med" len="med"/>
+                      <a:tailEnd type="none" w="med" len="med"/>
+                    </a:lnB>
+                    <a:solidFill>
+                      <a:schemeClr val="bg1">
+                        <a:lumMod val="95000"/>
+                      </a:schemeClr>
+                    </a:solidFill>
+                  </a:tcPr>
+                </a:tc>
+                <a:tc>
+                  <a:txBody>
+                    <a:bodyPr/>
+                    <a:lstStyle/>
+                    <a:p>
+                      <a:pPr algn="ctr"/>
+                      <a:r>
+                        <a:rPr lang="en-US" sz="2600" dirty="0" smtClean="0"/>
+                        <a:t>57%</a:t>
+                      </a:r>
+                      <a:endParaRPr lang="en-US" sz="2600" dirty="0"/>
+                    </a:p>
+                  </a:txBody>
+                  <a:tcPr>
+                    <a:lnT w="12700" cap="flat" cmpd="sng" algn="ctr">
+                      <a:solidFill>
+                        <a:schemeClr val="tx1"/>
+                      </a:solidFill>
+                      <a:prstDash val="solid"/>
+                      <a:round/>
+                      <a:headEnd type="none" w="med" len="med"/>
+                      <a:tailEnd type="none" w="med" len="med"/>
+                    </a:lnT>
+                    <a:lnB w="12700" cap="flat" cmpd="sng" algn="ctr">
+                      <a:solidFill>
+                        <a:schemeClr val="tx1"/>
+                      </a:solidFill>
+                      <a:prstDash val="solid"/>
+                      <a:round/>
+                      <a:headEnd type="none" w="med" len="med"/>
+                      <a:tailEnd type="none" w="med" len="med"/>
+                    </a:lnB>
+                    <a:solidFill>
+                      <a:schemeClr val="bg1">
+                        <a:lumMod val="95000"/>
+                      </a:schemeClr>
+                    </a:solidFill>
+                  </a:tcPr>
+                </a:tc>
+              </a:tr>
+            </a:tbl>
+          </a:graphicData>
+        </a:graphic>
+      </p:graphicFrame>
+      <p:pic>
+        <p:nvPicPr>
+          <p:cNvPr id="7" name="Picture 6"/>
+          <p:cNvPicPr>
+            <a:picLocks noChangeAspect="1"/>
+          </p:cNvPicPr>
+          <p:nvPr/>
+        </p:nvPicPr>
+        <p:blipFill>
+          <a:blip r:embed="rId6"/>
+          <a:stretch>
+            <a:fillRect/>
+          </a:stretch>
+        </p:blipFill>
+        <p:spPr>
+          <a:xfrm>
+            <a:off x="20699475" y="24103242"/>
+            <a:ext cx="3384902" cy="3998744"/>
+          </a:xfrm>
+          <a:prstGeom prst="rect">
+            <a:avLst/>
+          </a:prstGeom>
+        </p:spPr>
+      </p:pic>
+      <p:pic>
+        <p:nvPicPr>
+          <p:cNvPr id="9" name="Picture 8"/>
+          <p:cNvPicPr>
+            <a:picLocks noChangeAspect="1"/>
+          </p:cNvPicPr>
+          <p:nvPr/>
+        </p:nvPicPr>
+        <p:blipFill rotWithShape="1">
+          <a:blip r:embed="rId7">
+            <a:extLst>
+              <a:ext uri="{28A0092B-C50C-407E-A947-70E740481C1C}">
+                <a14:useLocalDpi xmlns:a14="http://schemas.microsoft.com/office/drawing/2010/main" val="0"/>
+              </a:ext>
+            </a:extLst>
+          </a:blip>
+          <a:srcRect l="3825" t="4608" r="7471"/>
+          <a:stretch/>
+        </p:blipFill>
+        <p:spPr>
+          <a:xfrm>
+            <a:off x="24633094" y="23874245"/>
+            <a:ext cx="8111158" cy="4361325"/>
+          </a:xfrm>
+          <a:prstGeom prst="rect">
+            <a:avLst/>
+          </a:prstGeom>
+        </p:spPr>
+      </p:pic>
     </p:spTree>
     <p:extLst>
       <p:ext uri="{BB962C8B-B14F-4D97-AF65-F5344CB8AC3E}">

</xml_diff>